<commit_message>
paper and plot updates
</commit_message>
<xml_diff>
--- a/talks/hyperbole_metaphor_11192013.pptx
+++ b/talks/hyperbole_metaphor_11192013.pptx
@@ -5,7 +5,7 @@
     <p:sldMasterId id="2147483648" r:id="rId1"/>
   </p:sldMasterIdLst>
   <p:notesMasterIdLst>
-    <p:notesMasterId r:id="rId37"/>
+    <p:notesMasterId r:id="rId36"/>
   </p:notesMasterIdLst>
   <p:sldIdLst>
     <p:sldId id="256" r:id="rId2"/>
@@ -21,28 +21,27 @@
     <p:sldId id="279" r:id="rId12"/>
     <p:sldId id="257" r:id="rId13"/>
     <p:sldId id="270" r:id="rId14"/>
-    <p:sldId id="269" r:id="rId15"/>
-    <p:sldId id="268" r:id="rId16"/>
-    <p:sldId id="272" r:id="rId17"/>
-    <p:sldId id="273" r:id="rId18"/>
-    <p:sldId id="275" r:id="rId19"/>
-    <p:sldId id="284" r:id="rId20"/>
-    <p:sldId id="274" r:id="rId21"/>
-    <p:sldId id="302" r:id="rId22"/>
-    <p:sldId id="285" r:id="rId23"/>
-    <p:sldId id="286" r:id="rId24"/>
-    <p:sldId id="287" r:id="rId25"/>
-    <p:sldId id="290" r:id="rId26"/>
-    <p:sldId id="291" r:id="rId27"/>
-    <p:sldId id="292" r:id="rId28"/>
-    <p:sldId id="294" r:id="rId29"/>
-    <p:sldId id="297" r:id="rId30"/>
-    <p:sldId id="296" r:id="rId31"/>
-    <p:sldId id="300" r:id="rId32"/>
-    <p:sldId id="299" r:id="rId33"/>
-    <p:sldId id="301" r:id="rId34"/>
-    <p:sldId id="295" r:id="rId35"/>
-    <p:sldId id="305" r:id="rId36"/>
+    <p:sldId id="268" r:id="rId15"/>
+    <p:sldId id="272" r:id="rId16"/>
+    <p:sldId id="273" r:id="rId17"/>
+    <p:sldId id="275" r:id="rId18"/>
+    <p:sldId id="284" r:id="rId19"/>
+    <p:sldId id="274" r:id="rId20"/>
+    <p:sldId id="302" r:id="rId21"/>
+    <p:sldId id="285" r:id="rId22"/>
+    <p:sldId id="286" r:id="rId23"/>
+    <p:sldId id="287" r:id="rId24"/>
+    <p:sldId id="290" r:id="rId25"/>
+    <p:sldId id="291" r:id="rId26"/>
+    <p:sldId id="292" r:id="rId27"/>
+    <p:sldId id="294" r:id="rId28"/>
+    <p:sldId id="297" r:id="rId29"/>
+    <p:sldId id="296" r:id="rId30"/>
+    <p:sldId id="300" r:id="rId31"/>
+    <p:sldId id="299" r:id="rId32"/>
+    <p:sldId id="301" r:id="rId33"/>
+    <p:sldId id="295" r:id="rId34"/>
+    <p:sldId id="305" r:id="rId35"/>
   </p:sldIdLst>
   <p:sldSz cx="9144000" cy="6858000" type="screen4x3"/>
   <p:notesSz cx="6858000" cy="9144000"/>
@@ -226,7 +225,7 @@
           <a:p>
             <a:fld id="{33E5620A-53D7-5A44-BA73-D914B185660E}" type="datetimeFigureOut">
               <a:rPr lang="en-US" smtClean="0"/>
-              <a:t>11/18/13</a:t>
+              <a:t>1/24/14</a:t>
             </a:fld>
             <a:endParaRPr lang="en-US"/>
           </a:p>
@@ -843,7 +842,7 @@
           <a:p>
             <a:fld id="{DF4CD76E-32C4-934A-BBD7-733166B277EE}" type="datetimeFigureOut">
               <a:rPr lang="en-US" smtClean="0"/>
-              <a:t>11/18/13</a:t>
+              <a:t>1/24/14</a:t>
             </a:fld>
             <a:endParaRPr lang="en-US"/>
           </a:p>
@@ -1013,7 +1012,7 @@
           <a:p>
             <a:fld id="{DF4CD76E-32C4-934A-BBD7-733166B277EE}" type="datetimeFigureOut">
               <a:rPr lang="en-US" smtClean="0"/>
-              <a:t>11/18/13</a:t>
+              <a:t>1/24/14</a:t>
             </a:fld>
             <a:endParaRPr lang="en-US"/>
           </a:p>
@@ -1193,7 +1192,7 @@
           <a:p>
             <a:fld id="{DF4CD76E-32C4-934A-BBD7-733166B277EE}" type="datetimeFigureOut">
               <a:rPr lang="en-US" smtClean="0"/>
-              <a:t>11/18/13</a:t>
+              <a:t>1/24/14</a:t>
             </a:fld>
             <a:endParaRPr lang="en-US"/>
           </a:p>
@@ -1363,7 +1362,7 @@
           <a:p>
             <a:fld id="{DF4CD76E-32C4-934A-BBD7-733166B277EE}" type="datetimeFigureOut">
               <a:rPr lang="en-US" smtClean="0"/>
-              <a:t>11/18/13</a:t>
+              <a:t>1/24/14</a:t>
             </a:fld>
             <a:endParaRPr lang="en-US"/>
           </a:p>
@@ -1609,7 +1608,7 @@
           <a:p>
             <a:fld id="{DF4CD76E-32C4-934A-BBD7-733166B277EE}" type="datetimeFigureOut">
               <a:rPr lang="en-US" smtClean="0"/>
-              <a:t>11/18/13</a:t>
+              <a:t>1/24/14</a:t>
             </a:fld>
             <a:endParaRPr lang="en-US"/>
           </a:p>
@@ -1897,7 +1896,7 @@
           <a:p>
             <a:fld id="{DF4CD76E-32C4-934A-BBD7-733166B277EE}" type="datetimeFigureOut">
               <a:rPr lang="en-US" smtClean="0"/>
-              <a:t>11/18/13</a:t>
+              <a:t>1/24/14</a:t>
             </a:fld>
             <a:endParaRPr lang="en-US"/>
           </a:p>
@@ -2319,7 +2318,7 @@
           <a:p>
             <a:fld id="{DF4CD76E-32C4-934A-BBD7-733166B277EE}" type="datetimeFigureOut">
               <a:rPr lang="en-US" smtClean="0"/>
-              <a:t>11/18/13</a:t>
+              <a:t>1/24/14</a:t>
             </a:fld>
             <a:endParaRPr lang="en-US"/>
           </a:p>
@@ -2437,7 +2436,7 @@
           <a:p>
             <a:fld id="{DF4CD76E-32C4-934A-BBD7-733166B277EE}" type="datetimeFigureOut">
               <a:rPr lang="en-US" smtClean="0"/>
-              <a:t>11/18/13</a:t>
+              <a:t>1/24/14</a:t>
             </a:fld>
             <a:endParaRPr lang="en-US"/>
           </a:p>
@@ -2532,7 +2531,7 @@
           <a:p>
             <a:fld id="{DF4CD76E-32C4-934A-BBD7-733166B277EE}" type="datetimeFigureOut">
               <a:rPr lang="en-US" smtClean="0"/>
-              <a:t>11/18/13</a:t>
+              <a:t>1/24/14</a:t>
             </a:fld>
             <a:endParaRPr lang="en-US"/>
           </a:p>
@@ -2809,7 +2808,7 @@
           <a:p>
             <a:fld id="{DF4CD76E-32C4-934A-BBD7-733166B277EE}" type="datetimeFigureOut">
               <a:rPr lang="en-US" smtClean="0"/>
-              <a:t>11/18/13</a:t>
+              <a:t>1/24/14</a:t>
             </a:fld>
             <a:endParaRPr lang="en-US"/>
           </a:p>
@@ -3062,7 +3061,7 @@
           <a:p>
             <a:fld id="{DF4CD76E-32C4-934A-BBD7-733166B277EE}" type="datetimeFigureOut">
               <a:rPr lang="en-US" smtClean="0"/>
-              <a:t>11/18/13</a:t>
+              <a:t>1/24/14</a:t>
             </a:fld>
             <a:endParaRPr lang="en-US"/>
           </a:p>
@@ -3275,7 +3274,7 @@
           <a:p>
             <a:fld id="{DF4CD76E-32C4-934A-BBD7-733166B277EE}" type="datetimeFigureOut">
               <a:rPr lang="en-US" smtClean="0"/>
-              <a:t>11/18/13</a:t>
+              <a:t>1/24/14</a:t>
             </a:fld>
             <a:endParaRPr lang="en-US"/>
           </a:p>
@@ -3917,7 +3916,7 @@
         </p:blipFill>
         <p:spPr>
           <a:xfrm>
-            <a:off x="190500" y="1600200"/>
+            <a:off x="190500" y="1613430"/>
             <a:ext cx="8590420" cy="4724400"/>
           </a:xfrm>
         </p:spPr>
@@ -4134,96 +4133,6 @@
           <a:chExt cx="0" cy="0"/>
         </a:xfrm>
       </p:grpSpPr>
-      <p:sp>
-        <p:nvSpPr>
-          <p:cNvPr id="2" name="Title 1"/>
-          <p:cNvSpPr>
-            <a:spLocks noGrp="1"/>
-          </p:cNvSpPr>
-          <p:nvPr>
-            <p:ph type="title"/>
-          </p:nvPr>
-        </p:nvSpPr>
-        <p:spPr/>
-        <p:txBody>
-          <a:bodyPr/>
-          <a:lstStyle/>
-          <a:p>
-            <a:r>
-              <a:rPr lang="en-US" dirty="0" smtClean="0"/>
-              <a:t>Comparison with humans</a:t>
-            </a:r>
-            <a:endParaRPr lang="en-US" dirty="0"/>
-          </a:p>
-        </p:txBody>
-      </p:sp>
-      <p:pic>
-        <p:nvPicPr>
-          <p:cNvPr id="4" name="Content Placeholder 3" descr="church_human_bar_full.pdf"/>
-          <p:cNvPicPr>
-            <a:picLocks noGrp="1" noChangeAspect="1"/>
-          </p:cNvPicPr>
-          <p:nvPr>
-            <p:ph idx="1"/>
-          </p:nvPr>
-        </p:nvPicPr>
-        <p:blipFill>
-          <a:blip r:embed="rId2">
-            <a:extLst>
-              <a:ext uri="{28A0092B-C50C-407E-A947-70E740481C1C}">
-                <a14:useLocalDpi xmlns:a14="http://schemas.microsoft.com/office/drawing/2010/main" val="0"/>
-              </a:ext>
-            </a:extLst>
-          </a:blip>
-          <a:srcRect t="-7288" b="-7288"/>
-          <a:stretch>
-            <a:fillRect/>
-          </a:stretch>
-        </p:blipFill>
-        <p:spPr>
-          <a:xfrm>
-            <a:off x="0" y="1348756"/>
-            <a:ext cx="9144000" cy="5028849"/>
-          </a:xfrm>
-        </p:spPr>
-      </p:pic>
-    </p:spTree>
-    <p:extLst>
-      <p:ext uri="{BB962C8B-B14F-4D97-AF65-F5344CB8AC3E}">
-        <p14:creationId xmlns:p14="http://schemas.microsoft.com/office/powerpoint/2010/main" val="3898041411"/>
-      </p:ext>
-    </p:extLst>
-  </p:cSld>
-  <p:clrMapOvr>
-    <a:masterClrMapping/>
-  </p:clrMapOvr>
-  <p:timing>
-    <p:tnLst>
-      <p:par>
-        <p:cTn xmlns:p14="http://schemas.microsoft.com/office/powerpoint/2010/main" id="1" dur="indefinite" restart="never" nodeType="tmRoot"/>
-      </p:par>
-    </p:tnLst>
-  </p:timing>
-</p:sld>
-</file>
-
-<file path=ppt/slides/slide15.xml><?xml version="1.0" encoding="utf-8"?>
-<p:sld xmlns:a="http://schemas.openxmlformats.org/drawingml/2006/main" xmlns:r="http://schemas.openxmlformats.org/officeDocument/2006/relationships" xmlns:p="http://schemas.openxmlformats.org/presentationml/2006/main">
-  <p:cSld>
-    <p:spTree>
-      <p:nvGrpSpPr>
-        <p:cNvPr id="1" name=""/>
-        <p:cNvGrpSpPr/>
-        <p:nvPr/>
-      </p:nvGrpSpPr>
-      <p:grpSpPr>
-        <a:xfrm>
-          <a:off x="0" y="0"/>
-          <a:ext cx="0" cy="0"/>
-          <a:chOff x="0" y="0"/>
-          <a:chExt cx="0" cy="0"/>
-        </a:xfrm>
-      </p:grpSpPr>
       <p:pic>
         <p:nvPicPr>
           <p:cNvPr id="3" name="Picture 2" descr="human_model_scatter.pdf"/>
@@ -4302,7 +4211,7 @@
 </p:sld>
 </file>
 
-<file path=ppt/slides/slide16.xml><?xml version="1.0" encoding="utf-8"?>
+<file path=ppt/slides/slide15.xml><?xml version="1.0" encoding="utf-8"?>
 <p:sld xmlns:a="http://schemas.openxmlformats.org/drawingml/2006/main" xmlns:r="http://schemas.openxmlformats.org/officeDocument/2006/relationships" xmlns:p="http://schemas.openxmlformats.org/presentationml/2006/main">
   <p:cSld>
     <p:spTree>
@@ -4415,7 +4324,7 @@
 </p:sld>
 </file>
 
-<file path=ppt/slides/slide17.xml><?xml version="1.0" encoding="utf-8"?>
+<file path=ppt/slides/slide16.xml><?xml version="1.0" encoding="utf-8"?>
 <p:sld xmlns:a="http://schemas.openxmlformats.org/drawingml/2006/main" xmlns:r="http://schemas.openxmlformats.org/officeDocument/2006/relationships" xmlns:p="http://schemas.openxmlformats.org/presentationml/2006/main">
   <p:cSld>
     <p:spTree>
@@ -4528,7 +4437,7 @@
 </p:sld>
 </file>
 
-<file path=ppt/slides/slide18.xml><?xml version="1.0" encoding="utf-8"?>
+<file path=ppt/slides/slide17.xml><?xml version="1.0" encoding="utf-8"?>
 <p:sld xmlns:a="http://schemas.openxmlformats.org/drawingml/2006/main" xmlns:r="http://schemas.openxmlformats.org/officeDocument/2006/relationships" xmlns:p="http://schemas.openxmlformats.org/presentationml/2006/main">
   <p:cSld>
     <p:spTree>
@@ -4641,7 +4550,7 @@
 </p:sld>
 </file>
 
-<file path=ppt/slides/slide19.xml><?xml version="1.0" encoding="utf-8"?>
+<file path=ppt/slides/slide18.xml><?xml version="1.0" encoding="utf-8"?>
 <p:sld xmlns:a="http://schemas.openxmlformats.org/drawingml/2006/main" xmlns:r="http://schemas.openxmlformats.org/officeDocument/2006/relationships" xmlns:p="http://schemas.openxmlformats.org/presentationml/2006/main">
   <p:cSld>
     <p:spTree>
@@ -4731,169 +4640,7 @@
 </p:sld>
 </file>
 
-<file path=ppt/slides/slide2.xml><?xml version="1.0" encoding="utf-8"?>
-<p:sld xmlns:a="http://schemas.openxmlformats.org/drawingml/2006/main" xmlns:r="http://schemas.openxmlformats.org/officeDocument/2006/relationships" xmlns:p="http://schemas.openxmlformats.org/presentationml/2006/main">
-  <p:cSld>
-    <p:spTree>
-      <p:nvGrpSpPr>
-        <p:cNvPr id="1" name=""/>
-        <p:cNvGrpSpPr/>
-        <p:nvPr/>
-      </p:nvGrpSpPr>
-      <p:grpSpPr>
-        <a:xfrm>
-          <a:off x="0" y="0"/>
-          <a:ext cx="0" cy="0"/>
-          <a:chOff x="0" y="0"/>
-          <a:chExt cx="0" cy="0"/>
-        </a:xfrm>
-      </p:grpSpPr>
-      <p:sp>
-        <p:nvSpPr>
-          <p:cNvPr id="2" name="Title 1"/>
-          <p:cNvSpPr>
-            <a:spLocks noGrp="1"/>
-          </p:cNvSpPr>
-          <p:nvPr>
-            <p:ph type="title"/>
-          </p:nvPr>
-        </p:nvSpPr>
-        <p:spPr/>
-        <p:txBody>
-          <a:bodyPr/>
-          <a:lstStyle/>
-          <a:p>
-            <a:r>
-              <a:rPr lang="en-US" dirty="0" smtClean="0"/>
-              <a:t>Non-literal language</a:t>
-            </a:r>
-            <a:endParaRPr lang="en-US" dirty="0"/>
-          </a:p>
-        </p:txBody>
-      </p:sp>
-      <p:sp>
-        <p:nvSpPr>
-          <p:cNvPr id="3" name="Content Placeholder 2"/>
-          <p:cNvSpPr>
-            <a:spLocks noGrp="1"/>
-          </p:cNvSpPr>
-          <p:nvPr>
-            <p:ph idx="1"/>
-          </p:nvPr>
-        </p:nvSpPr>
-        <p:spPr>
-          <a:xfrm>
-            <a:off x="949512" y="2015374"/>
-            <a:ext cx="7155212" cy="3980225"/>
-          </a:xfrm>
-        </p:spPr>
-        <p:txBody>
-          <a:bodyPr>
-            <a:normAutofit/>
-          </a:bodyPr>
-          <a:lstStyle/>
-          <a:p>
-            <a:r>
-              <a:rPr lang="en-US" sz="2600" dirty="0" smtClean="0"/>
-              <a:t>Romeo: “Juliet is the sun.”</a:t>
-            </a:r>
-          </a:p>
-          <a:p>
-            <a:r>
-              <a:rPr lang="en-US" sz="2600" dirty="0" smtClean="0"/>
-              <a:t>Leon </a:t>
-            </a:r>
-            <a:r>
-              <a:rPr lang="en-US" sz="2600" dirty="0"/>
-              <a:t>Bergen: “Halloween is </a:t>
-            </a:r>
-            <a:r>
-              <a:rPr lang="en-US" sz="2600" dirty="0" smtClean="0"/>
-              <a:t>my favorite day </a:t>
-            </a:r>
-            <a:r>
-              <a:rPr lang="en-US" sz="2600" dirty="0"/>
-              <a:t>of the year.</a:t>
-            </a:r>
-            <a:r>
-              <a:rPr lang="en-US" sz="2600" dirty="0" smtClean="0"/>
-              <a:t>”</a:t>
-            </a:r>
-          </a:p>
-          <a:p>
-            <a:r>
-              <a:rPr lang="en-US" sz="2600" dirty="0"/>
-              <a:t>Disgruntled </a:t>
-            </a:r>
-            <a:r>
-              <a:rPr lang="en-US" sz="2600" dirty="0" smtClean="0"/>
-              <a:t>Yelp reviewer</a:t>
-            </a:r>
-            <a:r>
-              <a:rPr lang="en-US" sz="2600" dirty="0"/>
-              <a:t>: “It took a million hours </a:t>
-            </a:r>
-            <a:r>
-              <a:rPr lang="en-US" sz="2600" dirty="0" smtClean="0"/>
-              <a:t>to </a:t>
-            </a:r>
-            <a:r>
-              <a:rPr lang="en-US" sz="2600" dirty="0"/>
-              <a:t>get seated.</a:t>
-            </a:r>
-            <a:r>
-              <a:rPr lang="en-US" sz="2600" dirty="0" smtClean="0"/>
-              <a:t>”</a:t>
-            </a:r>
-          </a:p>
-          <a:p>
-            <a:pPr marL="0" indent="0">
-              <a:buNone/>
-            </a:pPr>
-            <a:endParaRPr lang="en-US" sz="2600" dirty="0" smtClean="0"/>
-          </a:p>
-          <a:p>
-            <a:pPr marL="0" indent="0">
-              <a:buNone/>
-            </a:pPr>
-            <a:r>
-              <a:rPr lang="en-US" sz="2600" dirty="0" smtClean="0"/>
-              <a:t>How do people figure out what these sentences mean?</a:t>
-            </a:r>
-            <a:endParaRPr lang="en-US" sz="2600" dirty="0"/>
-          </a:p>
-          <a:p>
-            <a:endParaRPr lang="en-US" sz="2600" dirty="0"/>
-          </a:p>
-          <a:p>
-            <a:endParaRPr lang="en-US" sz="2600" dirty="0" smtClean="0"/>
-          </a:p>
-          <a:p>
-            <a:endParaRPr lang="en-US" sz="2600" dirty="0" smtClean="0"/>
-          </a:p>
-        </p:txBody>
-      </p:sp>
-    </p:spTree>
-    <p:extLst>
-      <p:ext uri="{BB962C8B-B14F-4D97-AF65-F5344CB8AC3E}">
-        <p14:creationId xmlns:p14="http://schemas.microsoft.com/office/powerpoint/2010/main" val="3903483450"/>
-      </p:ext>
-    </p:extLst>
-  </p:cSld>
-  <p:clrMapOvr>
-    <a:masterClrMapping/>
-  </p:clrMapOvr>
-  <p:timing>
-    <p:tnLst>
-      <p:par>
-        <p:cTn xmlns:p14="http://schemas.microsoft.com/office/powerpoint/2010/main" id="1" dur="indefinite" restart="never" nodeType="tmRoot"/>
-      </p:par>
-    </p:tnLst>
-  </p:timing>
-</p:sld>
-</file>
-
-<file path=ppt/slides/slide20.xml><?xml version="1.0" encoding="utf-8"?>
+<file path=ppt/slides/slide19.xml><?xml version="1.0" encoding="utf-8"?>
 <p:sld xmlns:a="http://schemas.openxmlformats.org/drawingml/2006/main" xmlns:r="http://schemas.openxmlformats.org/officeDocument/2006/relationships" xmlns:p="http://schemas.openxmlformats.org/presentationml/2006/main">
   <p:cSld>
     <p:spTree>
@@ -5006,7 +4753,147 @@
 </p:sld>
 </file>
 
-<file path=ppt/slides/slide21.xml><?xml version="1.0" encoding="utf-8"?>
+<file path=ppt/slides/slide2.xml><?xml version="1.0" encoding="utf-8"?>
+<p:sld xmlns:a="http://schemas.openxmlformats.org/drawingml/2006/main" xmlns:r="http://schemas.openxmlformats.org/officeDocument/2006/relationships" xmlns:p="http://schemas.openxmlformats.org/presentationml/2006/main">
+  <p:cSld>
+    <p:spTree>
+      <p:nvGrpSpPr>
+        <p:cNvPr id="1" name=""/>
+        <p:cNvGrpSpPr/>
+        <p:nvPr/>
+      </p:nvGrpSpPr>
+      <p:grpSpPr>
+        <a:xfrm>
+          <a:off x="0" y="0"/>
+          <a:ext cx="0" cy="0"/>
+          <a:chOff x="0" y="0"/>
+          <a:chExt cx="0" cy="0"/>
+        </a:xfrm>
+      </p:grpSpPr>
+      <p:sp>
+        <p:nvSpPr>
+          <p:cNvPr id="2" name="Title 1"/>
+          <p:cNvSpPr>
+            <a:spLocks noGrp="1"/>
+          </p:cNvSpPr>
+          <p:nvPr>
+            <p:ph type="title"/>
+          </p:nvPr>
+        </p:nvSpPr>
+        <p:spPr/>
+        <p:txBody>
+          <a:bodyPr/>
+          <a:lstStyle/>
+          <a:p>
+            <a:r>
+              <a:rPr lang="en-US" dirty="0" smtClean="0"/>
+              <a:t>Non-literal language</a:t>
+            </a:r>
+            <a:endParaRPr lang="en-US" dirty="0"/>
+          </a:p>
+        </p:txBody>
+      </p:sp>
+      <p:sp>
+        <p:nvSpPr>
+          <p:cNvPr id="3" name="Content Placeholder 2"/>
+          <p:cNvSpPr>
+            <a:spLocks noGrp="1"/>
+          </p:cNvSpPr>
+          <p:nvPr>
+            <p:ph idx="1"/>
+          </p:nvPr>
+        </p:nvSpPr>
+        <p:spPr>
+          <a:xfrm>
+            <a:off x="949512" y="2015374"/>
+            <a:ext cx="7155212" cy="3980225"/>
+          </a:xfrm>
+        </p:spPr>
+        <p:txBody>
+          <a:bodyPr>
+            <a:normAutofit/>
+          </a:bodyPr>
+          <a:lstStyle/>
+          <a:p>
+            <a:r>
+              <a:rPr lang="en-US" sz="2600" dirty="0" smtClean="0"/>
+              <a:t>Romeo: “Juliet is the sun.”</a:t>
+            </a:r>
+          </a:p>
+          <a:p>
+            <a:r>
+              <a:rPr lang="en-US" sz="2600" smtClean="0"/>
+              <a:t>Disgruntled restaurant </a:t>
+            </a:r>
+            <a:r>
+              <a:rPr lang="en-US" sz="2600" dirty="0" smtClean="0"/>
+              <a:t>reviewer</a:t>
+            </a:r>
+            <a:r>
+              <a:rPr lang="en-US" sz="2600" dirty="0"/>
+              <a:t>: “It took a million hours </a:t>
+            </a:r>
+            <a:r>
+              <a:rPr lang="en-US" sz="2600" dirty="0" smtClean="0"/>
+              <a:t>to </a:t>
+            </a:r>
+            <a:r>
+              <a:rPr lang="en-US" sz="2600" dirty="0"/>
+              <a:t>get seated.</a:t>
+            </a:r>
+            <a:r>
+              <a:rPr lang="en-US" sz="2600" dirty="0" smtClean="0"/>
+              <a:t>”</a:t>
+            </a:r>
+          </a:p>
+          <a:p>
+            <a:pPr marL="0" indent="0">
+              <a:buNone/>
+            </a:pPr>
+            <a:endParaRPr lang="en-US" sz="2600" dirty="0" smtClean="0"/>
+          </a:p>
+          <a:p>
+            <a:pPr marL="0" indent="0">
+              <a:buNone/>
+            </a:pPr>
+            <a:r>
+              <a:rPr lang="en-US" sz="2600" dirty="0" smtClean="0"/>
+              <a:t>How do people figure out what these sentences mean?</a:t>
+            </a:r>
+            <a:endParaRPr lang="en-US" sz="2600" dirty="0"/>
+          </a:p>
+          <a:p>
+            <a:endParaRPr lang="en-US" sz="2600" dirty="0"/>
+          </a:p>
+          <a:p>
+            <a:endParaRPr lang="en-US" sz="2600" dirty="0" smtClean="0"/>
+          </a:p>
+          <a:p>
+            <a:endParaRPr lang="en-US" sz="2600" dirty="0" smtClean="0"/>
+          </a:p>
+        </p:txBody>
+      </p:sp>
+    </p:spTree>
+    <p:extLst>
+      <p:ext uri="{BB962C8B-B14F-4D97-AF65-F5344CB8AC3E}">
+        <p14:creationId xmlns:p14="http://schemas.microsoft.com/office/powerpoint/2010/main" val="3903483450"/>
+      </p:ext>
+    </p:extLst>
+  </p:cSld>
+  <p:clrMapOvr>
+    <a:masterClrMapping/>
+  </p:clrMapOvr>
+  <p:timing>
+    <p:tnLst>
+      <p:par>
+        <p:cTn xmlns:p14="http://schemas.microsoft.com/office/powerpoint/2010/main" id="1" dur="indefinite" restart="never" nodeType="tmRoot"/>
+      </p:par>
+    </p:tnLst>
+  </p:timing>
+</p:sld>
+</file>
+
+<file path=ppt/slides/slide20.xml><?xml version="1.0" encoding="utf-8"?>
 <p:sld xmlns:a="http://schemas.openxmlformats.org/drawingml/2006/main" xmlns:r="http://schemas.openxmlformats.org/officeDocument/2006/relationships" xmlns:p="http://schemas.openxmlformats.org/presentationml/2006/main">
   <p:cSld>
     <p:spTree>
@@ -5069,7 +4956,6 @@
               <a:rPr lang="en-US" sz="4000" i="1" dirty="0" smtClean="0"/>
               <a:t>everything…</a:t>
             </a:r>
-            <a:endParaRPr lang="en-US" sz="4000" i="1" dirty="0" smtClean="0"/>
           </a:p>
         </p:txBody>
       </p:sp>
@@ -5077,6 +4963,122 @@
     <p:extLst>
       <p:ext uri="{BB962C8B-B14F-4D97-AF65-F5344CB8AC3E}">
         <p14:creationId xmlns:p14="http://schemas.microsoft.com/office/powerpoint/2010/main" val="3717640276"/>
+      </p:ext>
+    </p:extLst>
+  </p:cSld>
+  <p:clrMapOvr>
+    <a:masterClrMapping/>
+  </p:clrMapOvr>
+  <p:timing>
+    <p:tnLst>
+      <p:par>
+        <p:cTn xmlns:p14="http://schemas.microsoft.com/office/powerpoint/2010/main" id="1" dur="indefinite" restart="never" nodeType="tmRoot"/>
+      </p:par>
+    </p:tnLst>
+  </p:timing>
+</p:sld>
+</file>
+
+<file path=ppt/slides/slide21.xml><?xml version="1.0" encoding="utf-8"?>
+<p:sld xmlns:a="http://schemas.openxmlformats.org/drawingml/2006/main" xmlns:r="http://schemas.openxmlformats.org/officeDocument/2006/relationships" xmlns:p="http://schemas.openxmlformats.org/presentationml/2006/main">
+  <p:cSld>
+    <p:spTree>
+      <p:nvGrpSpPr>
+        <p:cNvPr id="1" name=""/>
+        <p:cNvGrpSpPr/>
+        <p:nvPr/>
+      </p:nvGrpSpPr>
+      <p:grpSpPr>
+        <a:xfrm>
+          <a:off x="0" y="0"/>
+          <a:ext cx="0" cy="0"/>
+          <a:chOff x="0" y="0"/>
+          <a:chExt cx="0" cy="0"/>
+        </a:xfrm>
+      </p:grpSpPr>
+      <p:sp>
+        <p:nvSpPr>
+          <p:cNvPr id="2" name="Title 1"/>
+          <p:cNvSpPr>
+            <a:spLocks noGrp="1"/>
+          </p:cNvSpPr>
+          <p:nvPr>
+            <p:ph type="title"/>
+          </p:nvPr>
+        </p:nvSpPr>
+        <p:spPr/>
+        <p:txBody>
+          <a:bodyPr/>
+          <a:lstStyle/>
+          <a:p>
+            <a:r>
+              <a:rPr lang="en-US" dirty="0" smtClean="0"/>
+              <a:t>Metaphor Interpretation</a:t>
+            </a:r>
+            <a:endParaRPr lang="en-US" dirty="0"/>
+          </a:p>
+        </p:txBody>
+      </p:sp>
+      <p:sp>
+        <p:nvSpPr>
+          <p:cNvPr id="3" name="Content Placeholder 2"/>
+          <p:cNvSpPr>
+            <a:spLocks noGrp="1"/>
+          </p:cNvSpPr>
+          <p:nvPr>
+            <p:ph idx="1"/>
+          </p:nvPr>
+        </p:nvSpPr>
+        <p:spPr>
+          <a:xfrm>
+            <a:off x="927100" y="1651000"/>
+            <a:ext cx="7493000" cy="4406900"/>
+          </a:xfrm>
+        </p:spPr>
+        <p:txBody>
+          <a:bodyPr/>
+          <a:lstStyle/>
+          <a:p>
+            <a:r>
+              <a:rPr lang="en-US" dirty="0" smtClean="0"/>
+              <a:t>“X is a Y” metaphors</a:t>
+            </a:r>
+          </a:p>
+          <a:p>
+            <a:pPr lvl="1"/>
+            <a:r>
+              <a:rPr lang="en-US" dirty="0" smtClean="0"/>
+              <a:t>“</a:t>
+            </a:r>
+            <a:r>
+              <a:rPr lang="en-US" dirty="0"/>
+              <a:t>Juliet </a:t>
+            </a:r>
+            <a:r>
+              <a:rPr lang="en-US" dirty="0" smtClean="0"/>
+              <a:t>is the sun.”</a:t>
+            </a:r>
+          </a:p>
+          <a:p>
+            <a:pPr lvl="1"/>
+            <a:r>
+              <a:rPr lang="en-US" dirty="0" smtClean="0"/>
+              <a:t>“My lawyer is a shark.”</a:t>
+            </a:r>
+          </a:p>
+          <a:p>
+            <a:pPr lvl="1"/>
+            <a:r>
+              <a:rPr lang="en-US" dirty="0" smtClean="0"/>
+              <a:t>“John is a lion.”</a:t>
+            </a:r>
+          </a:p>
+        </p:txBody>
+      </p:sp>
+    </p:spTree>
+    <p:extLst>
+      <p:ext uri="{BB962C8B-B14F-4D97-AF65-F5344CB8AC3E}">
+        <p14:creationId xmlns:p14="http://schemas.microsoft.com/office/powerpoint/2010/main" val="3896407871"/>
       </p:ext>
     </p:extLst>
   </p:cSld>
@@ -5120,14 +5122,19 @@
             <p:ph type="title"/>
           </p:nvPr>
         </p:nvSpPr>
-        <p:spPr/>
+        <p:spPr>
+          <a:xfrm>
+            <a:off x="457200" y="46038"/>
+            <a:ext cx="8229600" cy="1143000"/>
+          </a:xfrm>
+        </p:spPr>
         <p:txBody>
           <a:bodyPr/>
           <a:lstStyle/>
           <a:p>
             <a:r>
               <a:rPr lang="en-US" dirty="0" smtClean="0"/>
-              <a:t>Metaphor Interpretation</a:t>
+              <a:t>“John is a lion.”</a:t>
             </a:r>
             <a:endParaRPr lang="en-US" dirty="0"/>
           </a:p>
@@ -5135,7 +5142,7 @@
       </p:sp>
       <p:sp>
         <p:nvSpPr>
-          <p:cNvPr id="3" name="Content Placeholder 2"/>
+          <p:cNvPr id="4" name="Content Placeholder 3"/>
           <p:cNvSpPr>
             <a:spLocks noGrp="1"/>
           </p:cNvSpPr>
@@ -5145,54 +5152,218 @@
         </p:nvSpPr>
         <p:spPr>
           <a:xfrm>
-            <a:off x="927100" y="1651000"/>
-            <a:ext cx="7493000" cy="4406900"/>
+            <a:off x="139700" y="985838"/>
+            <a:ext cx="8788400" cy="5491162"/>
           </a:xfrm>
         </p:spPr>
         <p:txBody>
-          <a:bodyPr/>
+          <a:bodyPr>
+            <a:noAutofit/>
+          </a:bodyPr>
           <a:lstStyle/>
           <a:p>
             <a:r>
-              <a:rPr lang="en-US" dirty="0" smtClean="0"/>
-              <a:t>“X is a Y” metaphors</a:t>
+              <a:rPr lang="en-US" sz="2400" dirty="0" smtClean="0"/>
+              <a:t>Prior knowledge about John</a:t>
             </a:r>
           </a:p>
           <a:p>
             <a:pPr lvl="1"/>
             <a:r>
-              <a:rPr lang="en-US" dirty="0" smtClean="0"/>
-              <a:t>“</a:t>
-            </a:r>
-            <a:r>
-              <a:rPr lang="en-US" dirty="0"/>
-              <a:t>Juliet </a:t>
-            </a:r>
-            <a:r>
-              <a:rPr lang="en-US" dirty="0" smtClean="0"/>
-              <a:t>is the sun.”</a:t>
+              <a:rPr lang="en-US" sz="2000" dirty="0" smtClean="0"/>
+              <a:t>P(John is a human) = 0.9999999</a:t>
             </a:r>
           </a:p>
           <a:p>
             <a:pPr lvl="1"/>
             <a:r>
-              <a:rPr lang="en-US" dirty="0" smtClean="0"/>
-              <a:t>“My lawyer is a shark.”</a:t>
+              <a:rPr lang="en-US" sz="2000" dirty="0" smtClean="0"/>
+              <a:t>P(John is a lion) = 0.0000001</a:t>
+            </a:r>
+          </a:p>
+          <a:p>
+            <a:r>
+              <a:rPr lang="en-US" sz="2400" dirty="0" smtClean="0"/>
+              <a:t>Potential features of John</a:t>
             </a:r>
           </a:p>
           <a:p>
             <a:pPr lvl="1"/>
             <a:r>
-              <a:rPr lang="en-US" dirty="0" smtClean="0"/>
-              <a:t>“John is a lion.”</a:t>
-            </a:r>
+              <a:rPr lang="en-US" sz="2000" dirty="0" smtClean="0"/>
+              <a:t>John is male, John is skinny, John is fierce, John is brave….</a:t>
+            </a:r>
+          </a:p>
+          <a:p>
+            <a:r>
+              <a:rPr lang="en-US" sz="2400" dirty="0" smtClean="0"/>
+              <a:t>Prior </a:t>
+            </a:r>
+            <a:r>
+              <a:rPr lang="en-US" sz="2400" dirty="0"/>
+              <a:t>knowledge about features </a:t>
+            </a:r>
+            <a:r>
+              <a:rPr lang="en-US" sz="2400" dirty="0" smtClean="0"/>
+              <a:t>given </a:t>
+            </a:r>
+            <a:r>
+              <a:rPr lang="en-US" sz="2400" dirty="0"/>
+              <a:t>categories</a:t>
+            </a:r>
+          </a:p>
+          <a:p>
+            <a:pPr lvl="1"/>
+            <a:r>
+              <a:rPr lang="en-US" sz="2000" dirty="0"/>
+              <a:t>P</a:t>
+            </a:r>
+            <a:r>
+              <a:rPr lang="en-US" sz="2000" dirty="0" smtClean="0"/>
+              <a:t>(male| </a:t>
+            </a:r>
+            <a:r>
+              <a:rPr lang="en-US" sz="2000" dirty="0"/>
+              <a:t>human) = 0.5</a:t>
+            </a:r>
+          </a:p>
+          <a:p>
+            <a:pPr lvl="1"/>
+            <a:r>
+              <a:rPr lang="en-US" sz="2000" dirty="0"/>
+              <a:t>P</a:t>
+            </a:r>
+            <a:r>
+              <a:rPr lang="en-US" sz="2000" dirty="0" smtClean="0"/>
+              <a:t>(male </a:t>
+            </a:r>
+            <a:r>
+              <a:rPr lang="en-US" sz="2000" dirty="0"/>
+              <a:t>| </a:t>
+            </a:r>
+            <a:r>
+              <a:rPr lang="en-US" sz="2000" dirty="0" smtClean="0"/>
+              <a:t>lion) </a:t>
+            </a:r>
+            <a:r>
+              <a:rPr lang="en-US" sz="2000" dirty="0"/>
+              <a:t>= </a:t>
+            </a:r>
+            <a:r>
+              <a:rPr lang="en-US" sz="2000" dirty="0" smtClean="0"/>
+              <a:t>0.5</a:t>
+            </a:r>
+          </a:p>
+          <a:p>
+            <a:pPr lvl="1"/>
+            <a:r>
+              <a:rPr lang="en-US" sz="2000" dirty="0" smtClean="0"/>
+              <a:t>P</a:t>
+            </a:r>
+            <a:r>
+              <a:rPr lang="en-US" sz="2000" dirty="0"/>
+              <a:t>(skinny | human) = 0.5</a:t>
+            </a:r>
+          </a:p>
+          <a:p>
+            <a:pPr lvl="1"/>
+            <a:r>
+              <a:rPr lang="en-US" sz="2000" dirty="0"/>
+              <a:t>P(skinny | lion) = </a:t>
+            </a:r>
+            <a:r>
+              <a:rPr lang="en-US" sz="2000" dirty="0" smtClean="0"/>
+              <a:t>0.5</a:t>
+            </a:r>
+            <a:endParaRPr lang="en-US" sz="2000" dirty="0"/>
+          </a:p>
+          <a:p>
+            <a:pPr lvl="1"/>
+            <a:r>
+              <a:rPr lang="en-US" sz="2000" dirty="0"/>
+              <a:t>P(fierce | human) = 0.5</a:t>
+            </a:r>
+          </a:p>
+          <a:p>
+            <a:pPr lvl="1"/>
+            <a:r>
+              <a:rPr lang="en-US" sz="2000" b="1" dirty="0">
+                <a:solidFill>
+                  <a:srgbClr val="C0504D"/>
+                </a:solidFill>
+              </a:rPr>
+              <a:t>P(fierce | lion) = </a:t>
+            </a:r>
+            <a:r>
+              <a:rPr lang="en-US" sz="2000" b="1" dirty="0" smtClean="0">
+                <a:solidFill>
+                  <a:srgbClr val="C0504D"/>
+                </a:solidFill>
+              </a:rPr>
+              <a:t>0.9</a:t>
+            </a:r>
+          </a:p>
+          <a:p>
+            <a:pPr lvl="1"/>
+            <a:r>
+              <a:rPr lang="en-US" sz="2000" dirty="0"/>
+              <a:t>P</a:t>
+            </a:r>
+            <a:r>
+              <a:rPr lang="en-US" sz="2000" dirty="0" smtClean="0"/>
+              <a:t>(brave </a:t>
+            </a:r>
+            <a:r>
+              <a:rPr lang="en-US" sz="2000" dirty="0"/>
+              <a:t>| human) = 0.5</a:t>
+            </a:r>
+          </a:p>
+          <a:p>
+            <a:pPr lvl="1"/>
+            <a:r>
+              <a:rPr lang="en-US" sz="2000" b="1" dirty="0">
+                <a:solidFill>
+                  <a:srgbClr val="C0504D"/>
+                </a:solidFill>
+              </a:rPr>
+              <a:t>P</a:t>
+            </a:r>
+            <a:r>
+              <a:rPr lang="en-US" sz="2000" b="1" dirty="0" smtClean="0">
+                <a:solidFill>
+                  <a:srgbClr val="C0504D"/>
+                </a:solidFill>
+              </a:rPr>
+              <a:t>(brave </a:t>
+            </a:r>
+            <a:r>
+              <a:rPr lang="en-US" sz="2000" b="1" dirty="0">
+                <a:solidFill>
+                  <a:srgbClr val="C0504D"/>
+                </a:solidFill>
+              </a:rPr>
+              <a:t>| lion) = </a:t>
+            </a:r>
+            <a:r>
+              <a:rPr lang="en-US" sz="2000" b="1" dirty="0" smtClean="0">
+                <a:solidFill>
+                  <a:srgbClr val="C0504D"/>
+                </a:solidFill>
+              </a:rPr>
+              <a:t>0.9</a:t>
+            </a:r>
+            <a:endParaRPr lang="en-US" sz="2000" b="1" dirty="0">
+              <a:solidFill>
+                <a:srgbClr val="C0504D"/>
+              </a:solidFill>
+            </a:endParaRPr>
           </a:p>
         </p:txBody>
       </p:sp>
     </p:spTree>
     <p:extLst>
       <p:ext uri="{BB962C8B-B14F-4D97-AF65-F5344CB8AC3E}">
-        <p14:creationId xmlns:p14="http://schemas.microsoft.com/office/powerpoint/2010/main" val="3896407871"/>
+        <p14:creationId xmlns:p14="http://schemas.microsoft.com/office/powerpoint/2010/main" val="1050099741"/>
       </p:ext>
     </p:extLst>
   </p:cSld>
@@ -5228,291 +5399,6 @@
       </p:grpSpPr>
       <p:sp>
         <p:nvSpPr>
-          <p:cNvPr id="2" name="Title 1"/>
-          <p:cNvSpPr>
-            <a:spLocks noGrp="1"/>
-          </p:cNvSpPr>
-          <p:nvPr>
-            <p:ph type="title"/>
-          </p:nvPr>
-        </p:nvSpPr>
-        <p:spPr>
-          <a:xfrm>
-            <a:off x="457200" y="46038"/>
-            <a:ext cx="8229600" cy="1143000"/>
-          </a:xfrm>
-        </p:spPr>
-        <p:txBody>
-          <a:bodyPr/>
-          <a:lstStyle/>
-          <a:p>
-            <a:r>
-              <a:rPr lang="en-US" dirty="0" smtClean="0"/>
-              <a:t>“John is a lion.”</a:t>
-            </a:r>
-            <a:endParaRPr lang="en-US" dirty="0"/>
-          </a:p>
-        </p:txBody>
-      </p:sp>
-      <p:sp>
-        <p:nvSpPr>
-          <p:cNvPr id="4" name="Content Placeholder 3"/>
-          <p:cNvSpPr>
-            <a:spLocks noGrp="1"/>
-          </p:cNvSpPr>
-          <p:nvPr>
-            <p:ph idx="1"/>
-          </p:nvPr>
-        </p:nvSpPr>
-        <p:spPr>
-          <a:xfrm>
-            <a:off x="139700" y="985838"/>
-            <a:ext cx="8788400" cy="5491162"/>
-          </a:xfrm>
-        </p:spPr>
-        <p:txBody>
-          <a:bodyPr>
-            <a:noAutofit/>
-          </a:bodyPr>
-          <a:lstStyle/>
-          <a:p>
-            <a:r>
-              <a:rPr lang="en-US" sz="2400" dirty="0" smtClean="0"/>
-              <a:t>Prior knowledge about John</a:t>
-            </a:r>
-          </a:p>
-          <a:p>
-            <a:pPr lvl="1"/>
-            <a:r>
-              <a:rPr lang="en-US" sz="2000" dirty="0" smtClean="0"/>
-              <a:t>P(John is a human) = 0.9999999</a:t>
-            </a:r>
-          </a:p>
-          <a:p>
-            <a:pPr lvl="1"/>
-            <a:r>
-              <a:rPr lang="en-US" sz="2000" dirty="0" smtClean="0"/>
-              <a:t>P(John is a lion) = 0.0000001</a:t>
-            </a:r>
-          </a:p>
-          <a:p>
-            <a:r>
-              <a:rPr lang="en-US" sz="2400" dirty="0" smtClean="0"/>
-              <a:t>Potential features of John</a:t>
-            </a:r>
-          </a:p>
-          <a:p>
-            <a:pPr lvl="1"/>
-            <a:r>
-              <a:rPr lang="en-US" sz="2000" dirty="0" smtClean="0"/>
-              <a:t>John is male, John is skinny, John is fierce, John is brave….</a:t>
-            </a:r>
-          </a:p>
-          <a:p>
-            <a:r>
-              <a:rPr lang="en-US" sz="2400" dirty="0" smtClean="0"/>
-              <a:t>Prior </a:t>
-            </a:r>
-            <a:r>
-              <a:rPr lang="en-US" sz="2400" dirty="0"/>
-              <a:t>knowledge about features </a:t>
-            </a:r>
-            <a:r>
-              <a:rPr lang="en-US" sz="2400" dirty="0" smtClean="0"/>
-              <a:t>given </a:t>
-            </a:r>
-            <a:r>
-              <a:rPr lang="en-US" sz="2400" dirty="0"/>
-              <a:t>categories</a:t>
-            </a:r>
-          </a:p>
-          <a:p>
-            <a:pPr lvl="1"/>
-            <a:r>
-              <a:rPr lang="en-US" sz="2000" dirty="0"/>
-              <a:t>P</a:t>
-            </a:r>
-            <a:r>
-              <a:rPr lang="en-US" sz="2000" dirty="0" smtClean="0"/>
-              <a:t>(male| </a:t>
-            </a:r>
-            <a:r>
-              <a:rPr lang="en-US" sz="2000" dirty="0"/>
-              <a:t>human) = 0.5</a:t>
-            </a:r>
-          </a:p>
-          <a:p>
-            <a:pPr lvl="1"/>
-            <a:r>
-              <a:rPr lang="en-US" sz="2000" dirty="0"/>
-              <a:t>P</a:t>
-            </a:r>
-            <a:r>
-              <a:rPr lang="en-US" sz="2000" dirty="0" smtClean="0"/>
-              <a:t>(male </a:t>
-            </a:r>
-            <a:r>
-              <a:rPr lang="en-US" sz="2000" dirty="0"/>
-              <a:t>| </a:t>
-            </a:r>
-            <a:r>
-              <a:rPr lang="en-US" sz="2000" dirty="0" smtClean="0"/>
-              <a:t>lion) </a:t>
-            </a:r>
-            <a:r>
-              <a:rPr lang="en-US" sz="2000" dirty="0"/>
-              <a:t>= </a:t>
-            </a:r>
-            <a:r>
-              <a:rPr lang="en-US" sz="2000" dirty="0" smtClean="0"/>
-              <a:t>0.5</a:t>
-            </a:r>
-          </a:p>
-          <a:p>
-            <a:pPr lvl="1"/>
-            <a:r>
-              <a:rPr lang="en-US" sz="2000" dirty="0" smtClean="0"/>
-              <a:t>P</a:t>
-            </a:r>
-            <a:r>
-              <a:rPr lang="en-US" sz="2000" dirty="0"/>
-              <a:t>(skinny | human) = 0.5</a:t>
-            </a:r>
-          </a:p>
-          <a:p>
-            <a:pPr lvl="1"/>
-            <a:r>
-              <a:rPr lang="en-US" sz="2000" dirty="0"/>
-              <a:t>P(skinny | lion) = </a:t>
-            </a:r>
-            <a:r>
-              <a:rPr lang="en-US" sz="2000" dirty="0" smtClean="0"/>
-              <a:t>0.5</a:t>
-            </a:r>
-            <a:endParaRPr lang="en-US" sz="2000" dirty="0"/>
-          </a:p>
-          <a:p>
-            <a:pPr lvl="1"/>
-            <a:r>
-              <a:rPr lang="en-US" sz="2000" dirty="0"/>
-              <a:t>P(fierce | human) = 0.5</a:t>
-            </a:r>
-          </a:p>
-          <a:p>
-            <a:pPr lvl="1"/>
-            <a:r>
-              <a:rPr lang="en-US" sz="2000" b="1" dirty="0">
-                <a:solidFill>
-                  <a:srgbClr val="C0504D"/>
-                </a:solidFill>
-              </a:rPr>
-              <a:t>P(fierce | lion) = </a:t>
-            </a:r>
-            <a:r>
-              <a:rPr lang="en-US" sz="2000" b="1" dirty="0" smtClean="0">
-                <a:solidFill>
-                  <a:srgbClr val="C0504D"/>
-                </a:solidFill>
-              </a:rPr>
-              <a:t>0.9</a:t>
-            </a:r>
-          </a:p>
-          <a:p>
-            <a:pPr lvl="1"/>
-            <a:r>
-              <a:rPr lang="en-US" sz="2000" dirty="0"/>
-              <a:t>P</a:t>
-            </a:r>
-            <a:r>
-              <a:rPr lang="en-US" sz="2000" dirty="0" smtClean="0"/>
-              <a:t>(brave </a:t>
-            </a:r>
-            <a:r>
-              <a:rPr lang="en-US" sz="2000" dirty="0"/>
-              <a:t>| human) = 0.5</a:t>
-            </a:r>
-          </a:p>
-          <a:p>
-            <a:pPr lvl="1"/>
-            <a:r>
-              <a:rPr lang="en-US" sz="2000" b="1" dirty="0">
-                <a:solidFill>
-                  <a:srgbClr val="C0504D"/>
-                </a:solidFill>
-              </a:rPr>
-              <a:t>P</a:t>
-            </a:r>
-            <a:r>
-              <a:rPr lang="en-US" sz="2000" b="1" dirty="0" smtClean="0">
-                <a:solidFill>
-                  <a:srgbClr val="C0504D"/>
-                </a:solidFill>
-              </a:rPr>
-              <a:t>(brave </a:t>
-            </a:r>
-            <a:r>
-              <a:rPr lang="en-US" sz="2000" b="1" dirty="0">
-                <a:solidFill>
-                  <a:srgbClr val="C0504D"/>
-                </a:solidFill>
-              </a:rPr>
-              <a:t>| lion) = </a:t>
-            </a:r>
-            <a:r>
-              <a:rPr lang="en-US" sz="2000" b="1" dirty="0" smtClean="0">
-                <a:solidFill>
-                  <a:srgbClr val="C0504D"/>
-                </a:solidFill>
-              </a:rPr>
-              <a:t>0.9</a:t>
-            </a:r>
-            <a:endParaRPr lang="en-US" sz="2000" b="1" dirty="0">
-              <a:solidFill>
-                <a:srgbClr val="C0504D"/>
-              </a:solidFill>
-            </a:endParaRPr>
-          </a:p>
-        </p:txBody>
-      </p:sp>
-    </p:spTree>
-    <p:extLst>
-      <p:ext uri="{BB962C8B-B14F-4D97-AF65-F5344CB8AC3E}">
-        <p14:creationId xmlns:p14="http://schemas.microsoft.com/office/powerpoint/2010/main" val="1050099741"/>
-      </p:ext>
-    </p:extLst>
-  </p:cSld>
-  <p:clrMapOvr>
-    <a:masterClrMapping/>
-  </p:clrMapOvr>
-  <p:timing>
-    <p:tnLst>
-      <p:par>
-        <p:cTn xmlns:p14="http://schemas.microsoft.com/office/powerpoint/2010/main" id="1" dur="indefinite" restart="never" nodeType="tmRoot"/>
-      </p:par>
-    </p:tnLst>
-  </p:timing>
-</p:sld>
-</file>
-
-<file path=ppt/slides/slide24.xml><?xml version="1.0" encoding="utf-8"?>
-<p:sld xmlns:a="http://schemas.openxmlformats.org/drawingml/2006/main" xmlns:r="http://schemas.openxmlformats.org/officeDocument/2006/relationships" xmlns:p="http://schemas.openxmlformats.org/presentationml/2006/main">
-  <p:cSld>
-    <p:spTree>
-      <p:nvGrpSpPr>
-        <p:cNvPr id="1" name=""/>
-        <p:cNvGrpSpPr/>
-        <p:nvPr/>
-      </p:nvGrpSpPr>
-      <p:grpSpPr>
-        <a:xfrm>
-          <a:off x="0" y="0"/>
-          <a:ext cx="0" cy="0"/>
-          <a:chOff x="0" y="0"/>
-          <a:chExt cx="0" cy="0"/>
-        </a:xfrm>
-      </p:grpSpPr>
-      <p:sp>
-        <p:nvSpPr>
           <p:cNvPr id="4" name="Content Placeholder 3"/>
           <p:cNvSpPr>
             <a:spLocks noGrp="1"/>
@@ -5612,7 +5498,7 @@
 </p:sld>
 </file>
 
-<file path=ppt/slides/slide25.xml><?xml version="1.0" encoding="utf-8"?>
+<file path=ppt/slides/slide24.xml><?xml version="1.0" encoding="utf-8"?>
 <p:sld xmlns:a="http://schemas.openxmlformats.org/drawingml/2006/main" xmlns:r="http://schemas.openxmlformats.org/officeDocument/2006/relationships" xmlns:p="http://schemas.openxmlformats.org/presentationml/2006/main">
   <p:cSld>
     <p:spTree>
@@ -5850,7 +5736,6 @@
               <a:rPr lang="en-US" sz="2400" dirty="0" smtClean="0"/>
               <a:t>Is John brave?</a:t>
             </a:r>
-            <a:endParaRPr lang="en-US" sz="2400" dirty="0" smtClean="0"/>
           </a:p>
         </p:txBody>
       </p:sp>
@@ -5902,7 +5787,7 @@
 </p:sld>
 </file>
 
-<file path=ppt/slides/slide26.xml><?xml version="1.0" encoding="utf-8"?>
+<file path=ppt/slides/slide25.xml><?xml version="1.0" encoding="utf-8"?>
 <p:sld xmlns:a="http://schemas.openxmlformats.org/drawingml/2006/main" xmlns:r="http://schemas.openxmlformats.org/officeDocument/2006/relationships" xmlns:p="http://schemas.openxmlformats.org/presentationml/2006/main">
   <p:cSld>
     <p:spTree>
@@ -6058,7 +5943,7 @@
 </p:sld>
 </file>
 
-<file path=ppt/slides/slide27.xml><?xml version="1.0" encoding="utf-8"?>
+<file path=ppt/slides/slide26.xml><?xml version="1.0" encoding="utf-8"?>
 <p:sld xmlns:a="http://schemas.openxmlformats.org/drawingml/2006/main" xmlns:r="http://schemas.openxmlformats.org/officeDocument/2006/relationships" xmlns:p="http://schemas.openxmlformats.org/presentationml/2006/main">
   <p:cSld>
     <p:spTree>
@@ -6133,11 +6018,6 @@
               </a:rPr>
               <a:t>Is John brave?</a:t>
             </a:r>
-            <a:endParaRPr lang="en-US" sz="2400" b="1" dirty="0">
-              <a:solidFill>
-                <a:schemeClr val="accent2"/>
-              </a:solidFill>
-            </a:endParaRPr>
           </a:p>
         </p:txBody>
       </p:sp>
@@ -6249,7 +6129,7 @@
 </p:sld>
 </file>
 
-<file path=ppt/slides/slide28.xml><?xml version="1.0" encoding="utf-8"?>
+<file path=ppt/slides/slide27.xml><?xml version="1.0" encoding="utf-8"?>
 <p:sld xmlns:a="http://schemas.openxmlformats.org/drawingml/2006/main" xmlns:r="http://schemas.openxmlformats.org/officeDocument/2006/relationships" xmlns:p="http://schemas.openxmlformats.org/presentationml/2006/main">
   <p:cSld>
     <p:spTree>
@@ -6309,7 +6189,7 @@
 </p:sld>
 </file>
 
-<file path=ppt/slides/slide29.xml><?xml version="1.0" encoding="utf-8"?>
+<file path=ppt/slides/slide28.xml><?xml version="1.0" encoding="utf-8"?>
 <p:sld xmlns:a="http://schemas.openxmlformats.org/drawingml/2006/main" xmlns:r="http://schemas.openxmlformats.org/officeDocument/2006/relationships" xmlns:p="http://schemas.openxmlformats.org/presentationml/2006/main">
   <p:cSld>
     <p:spTree>
@@ -6755,159 +6635,7 @@
 </p:sld>
 </file>
 
-<file path=ppt/slides/slide3.xml><?xml version="1.0" encoding="utf-8"?>
-<p:sld xmlns:a="http://schemas.openxmlformats.org/drawingml/2006/main" xmlns:r="http://schemas.openxmlformats.org/officeDocument/2006/relationships" xmlns:p="http://schemas.openxmlformats.org/presentationml/2006/main">
-  <p:cSld>
-    <p:spTree>
-      <p:nvGrpSpPr>
-        <p:cNvPr id="1" name=""/>
-        <p:cNvGrpSpPr/>
-        <p:nvPr/>
-      </p:nvGrpSpPr>
-      <p:grpSpPr>
-        <a:xfrm>
-          <a:off x="0" y="0"/>
-          <a:ext cx="0" cy="0"/>
-          <a:chOff x="0" y="0"/>
-          <a:chExt cx="0" cy="0"/>
-        </a:xfrm>
-      </p:grpSpPr>
-      <p:sp>
-        <p:nvSpPr>
-          <p:cNvPr id="2" name="Title 1"/>
-          <p:cNvSpPr>
-            <a:spLocks noGrp="1"/>
-          </p:cNvSpPr>
-          <p:nvPr>
-            <p:ph type="title"/>
-          </p:nvPr>
-        </p:nvSpPr>
-        <p:spPr/>
-        <p:txBody>
-          <a:bodyPr>
-            <a:normAutofit fontScale="90000"/>
-          </a:bodyPr>
-          <a:lstStyle/>
-          <a:p>
-            <a:r>
-              <a:rPr lang="en-US" dirty="0" smtClean="0"/>
-              <a:t>Pragmatics as recursive </a:t>
-            </a:r>
-            <a:br>
-              <a:rPr lang="en-US" dirty="0" smtClean="0"/>
-            </a:br>
-            <a:r>
-              <a:rPr lang="en-US" dirty="0" smtClean="0"/>
-              <a:t>social reasoning</a:t>
-            </a:r>
-            <a:endParaRPr lang="en-US" dirty="0"/>
-          </a:p>
-        </p:txBody>
-      </p:sp>
-      <p:sp>
-        <p:nvSpPr>
-          <p:cNvPr id="3" name="Content Placeholder 2"/>
-          <p:cNvSpPr>
-            <a:spLocks noGrp="1"/>
-          </p:cNvSpPr>
-          <p:nvPr>
-            <p:ph idx="1"/>
-          </p:nvPr>
-        </p:nvSpPr>
-        <p:spPr>
-          <a:xfrm>
-            <a:off x="949511" y="2015374"/>
-            <a:ext cx="7508730" cy="3980225"/>
-          </a:xfrm>
-        </p:spPr>
-        <p:txBody>
-          <a:bodyPr>
-            <a:normAutofit/>
-          </a:bodyPr>
-          <a:lstStyle/>
-          <a:p>
-            <a:r>
-              <a:rPr lang="en-US" sz="2400" dirty="0"/>
-              <a:t>Starts with a listener who interprets utterances literally</a:t>
-            </a:r>
-          </a:p>
-          <a:p>
-            <a:r>
-              <a:rPr lang="en-US" sz="2400" dirty="0"/>
-              <a:t>Speaker chooses an utterance that will effectively communicate her intended message to the listener </a:t>
-            </a:r>
-          </a:p>
-          <a:p>
-            <a:r>
-              <a:rPr lang="en-US" sz="2400" dirty="0" smtClean="0"/>
-              <a:t>Pragmatic listener </a:t>
-            </a:r>
-            <a:r>
-              <a:rPr lang="en-US" sz="2400" dirty="0"/>
-              <a:t>then reasons about </a:t>
-            </a:r>
-            <a:r>
-              <a:rPr lang="en-US" sz="2400" dirty="0" smtClean="0"/>
-              <a:t>a speaker who reasons about the literal listener…and so on</a:t>
-            </a:r>
-          </a:p>
-          <a:p>
-            <a:pPr marL="0" indent="0">
-              <a:buNone/>
-            </a:pPr>
-            <a:endParaRPr lang="en-US" sz="2400" dirty="0" smtClean="0"/>
-          </a:p>
-          <a:p>
-            <a:pPr marL="0" indent="0">
-              <a:buNone/>
-            </a:pPr>
-            <a:r>
-              <a:rPr lang="en-US" sz="2400" dirty="0" smtClean="0"/>
-              <a:t>But when is saying something that is literally </a:t>
-            </a:r>
-            <a:r>
-              <a:rPr lang="en-US" sz="2400" i="1" dirty="0" smtClean="0"/>
-              <a:t>false</a:t>
-            </a:r>
-            <a:r>
-              <a:rPr lang="en-US" sz="2400" dirty="0" smtClean="0"/>
-              <a:t> (not </a:t>
-            </a:r>
-            <a:r>
-              <a:rPr lang="en-US" sz="2400" dirty="0" smtClean="0"/>
-              <a:t>just underspecified) </a:t>
-            </a:r>
-            <a:r>
-              <a:rPr lang="en-US" sz="2400" dirty="0" smtClean="0"/>
-              <a:t>ever a good idea?</a:t>
-            </a:r>
-          </a:p>
-          <a:p>
-            <a:endParaRPr lang="en-US" sz="2600" dirty="0" smtClean="0"/>
-          </a:p>
-        </p:txBody>
-      </p:sp>
-    </p:spTree>
-    <p:extLst>
-      <p:ext uri="{BB962C8B-B14F-4D97-AF65-F5344CB8AC3E}">
-        <p14:creationId xmlns:p14="http://schemas.microsoft.com/office/powerpoint/2010/main" val="3726743454"/>
-      </p:ext>
-    </p:extLst>
-  </p:cSld>
-  <p:clrMapOvr>
-    <a:masterClrMapping/>
-  </p:clrMapOvr>
-  <p:timing>
-    <p:tnLst>
-      <p:par>
-        <p:cTn xmlns:p14="http://schemas.microsoft.com/office/powerpoint/2010/main" id="1" dur="indefinite" restart="never" nodeType="tmRoot"/>
-      </p:par>
-    </p:tnLst>
-  </p:timing>
-</p:sld>
-</file>
-
-<file path=ppt/slides/slide30.xml><?xml version="1.0" encoding="utf-8"?>
+<file path=ppt/slides/slide29.xml><?xml version="1.0" encoding="utf-8"?>
 <p:sld xmlns:a="http://schemas.openxmlformats.org/drawingml/2006/main" xmlns:r="http://schemas.openxmlformats.org/officeDocument/2006/relationships" xmlns:p="http://schemas.openxmlformats.org/presentationml/2006/main">
   <p:cSld>
     <p:spTree>
@@ -7179,7 +6907,151 @@
 </p:sld>
 </file>
 
-<file path=ppt/slides/slide31.xml><?xml version="1.0" encoding="utf-8"?>
+<file path=ppt/slides/slide3.xml><?xml version="1.0" encoding="utf-8"?>
+<p:sld xmlns:a="http://schemas.openxmlformats.org/drawingml/2006/main" xmlns:r="http://schemas.openxmlformats.org/officeDocument/2006/relationships" xmlns:p="http://schemas.openxmlformats.org/presentationml/2006/main">
+  <p:cSld>
+    <p:spTree>
+      <p:nvGrpSpPr>
+        <p:cNvPr id="1" name=""/>
+        <p:cNvGrpSpPr/>
+        <p:nvPr/>
+      </p:nvGrpSpPr>
+      <p:grpSpPr>
+        <a:xfrm>
+          <a:off x="0" y="0"/>
+          <a:ext cx="0" cy="0"/>
+          <a:chOff x="0" y="0"/>
+          <a:chExt cx="0" cy="0"/>
+        </a:xfrm>
+      </p:grpSpPr>
+      <p:sp>
+        <p:nvSpPr>
+          <p:cNvPr id="2" name="Title 1"/>
+          <p:cNvSpPr>
+            <a:spLocks noGrp="1"/>
+          </p:cNvSpPr>
+          <p:nvPr>
+            <p:ph type="title"/>
+          </p:nvPr>
+        </p:nvSpPr>
+        <p:spPr/>
+        <p:txBody>
+          <a:bodyPr>
+            <a:normAutofit fontScale="90000"/>
+          </a:bodyPr>
+          <a:lstStyle/>
+          <a:p>
+            <a:r>
+              <a:rPr lang="en-US" dirty="0" smtClean="0"/>
+              <a:t>Pragmatics as recursive </a:t>
+            </a:r>
+            <a:br>
+              <a:rPr lang="en-US" dirty="0" smtClean="0"/>
+            </a:br>
+            <a:r>
+              <a:rPr lang="en-US" dirty="0" smtClean="0"/>
+              <a:t>social reasoning</a:t>
+            </a:r>
+            <a:endParaRPr lang="en-US" dirty="0"/>
+          </a:p>
+        </p:txBody>
+      </p:sp>
+      <p:sp>
+        <p:nvSpPr>
+          <p:cNvPr id="3" name="Content Placeholder 2"/>
+          <p:cNvSpPr>
+            <a:spLocks noGrp="1"/>
+          </p:cNvSpPr>
+          <p:nvPr>
+            <p:ph idx="1"/>
+          </p:nvPr>
+        </p:nvSpPr>
+        <p:spPr>
+          <a:xfrm>
+            <a:off x="949511" y="2015374"/>
+            <a:ext cx="7508730" cy="3980225"/>
+          </a:xfrm>
+        </p:spPr>
+        <p:txBody>
+          <a:bodyPr>
+            <a:normAutofit/>
+          </a:bodyPr>
+          <a:lstStyle/>
+          <a:p>
+            <a:r>
+              <a:rPr lang="en-US" sz="2400" dirty="0"/>
+              <a:t>Starts with a listener who interprets utterances literally</a:t>
+            </a:r>
+          </a:p>
+          <a:p>
+            <a:r>
+              <a:rPr lang="en-US" sz="2400" dirty="0"/>
+              <a:t>Speaker chooses an utterance that will effectively communicate her intended message to the listener </a:t>
+            </a:r>
+          </a:p>
+          <a:p>
+            <a:r>
+              <a:rPr lang="en-US" sz="2400" dirty="0" smtClean="0"/>
+              <a:t>Pragmatic listener </a:t>
+            </a:r>
+            <a:r>
+              <a:rPr lang="en-US" sz="2400" dirty="0"/>
+              <a:t>then reasons about </a:t>
+            </a:r>
+            <a:r>
+              <a:rPr lang="en-US" sz="2400" dirty="0" smtClean="0"/>
+              <a:t>a speaker who reasons about the literal listener…and so on</a:t>
+            </a:r>
+          </a:p>
+          <a:p>
+            <a:pPr marL="0" indent="0">
+              <a:buNone/>
+            </a:pPr>
+            <a:endParaRPr lang="en-US" sz="2400" dirty="0" smtClean="0"/>
+          </a:p>
+          <a:p>
+            <a:pPr marL="0" indent="0">
+              <a:buNone/>
+            </a:pPr>
+            <a:r>
+              <a:rPr lang="en-US" sz="2400" dirty="0" smtClean="0"/>
+              <a:t>But when is saying something that is literally </a:t>
+            </a:r>
+            <a:r>
+              <a:rPr lang="en-US" sz="2400" i="1" dirty="0" smtClean="0"/>
+              <a:t>false</a:t>
+            </a:r>
+            <a:r>
+              <a:rPr lang="en-US" sz="2400" dirty="0" smtClean="0"/>
+              <a:t> (not just underspecified) ever a good idea?</a:t>
+            </a:r>
+          </a:p>
+          <a:p>
+            <a:endParaRPr lang="en-US" sz="2600" dirty="0" smtClean="0"/>
+          </a:p>
+        </p:txBody>
+      </p:sp>
+    </p:spTree>
+    <p:extLst>
+      <p:ext uri="{BB962C8B-B14F-4D97-AF65-F5344CB8AC3E}">
+        <p14:creationId xmlns:p14="http://schemas.microsoft.com/office/powerpoint/2010/main" val="3726743454"/>
+      </p:ext>
+    </p:extLst>
+  </p:cSld>
+  <p:clrMapOvr>
+    <a:masterClrMapping/>
+  </p:clrMapOvr>
+  <p:timing>
+    <p:tnLst>
+      <p:par>
+        <p:cTn xmlns:p14="http://schemas.microsoft.com/office/powerpoint/2010/main" id="1" dur="indefinite" restart="never" nodeType="tmRoot"/>
+      </p:par>
+    </p:tnLst>
+  </p:timing>
+</p:sld>
+</file>
+
+<file path=ppt/slides/slide30.xml><?xml version="1.0" encoding="utf-8"?>
 <p:sld xmlns:a="http://schemas.openxmlformats.org/drawingml/2006/main" xmlns:r="http://schemas.openxmlformats.org/officeDocument/2006/relationships" xmlns:p="http://schemas.openxmlformats.org/presentationml/2006/main">
   <p:cSld>
     <p:spTree>
@@ -7511,7 +7383,7 @@
 </p:sld>
 </file>
 
-<file path=ppt/slides/slide32.xml><?xml version="1.0" encoding="utf-8"?>
+<file path=ppt/slides/slide31.xml><?xml version="1.0" encoding="utf-8"?>
 <p:sld xmlns:a="http://schemas.openxmlformats.org/drawingml/2006/main" xmlns:r="http://schemas.openxmlformats.org/officeDocument/2006/relationships" xmlns:p="http://schemas.openxmlformats.org/presentationml/2006/main">
   <p:cSld>
     <p:spTree>
@@ -7783,7 +7655,7 @@
 </p:sld>
 </file>
 
-<file path=ppt/slides/slide33.xml><?xml version="1.0" encoding="utf-8"?>
+<file path=ppt/slides/slide32.xml><?xml version="1.0" encoding="utf-8"?>
 <p:sld xmlns:a="http://schemas.openxmlformats.org/drawingml/2006/main" xmlns:r="http://schemas.openxmlformats.org/officeDocument/2006/relationships" xmlns:p="http://schemas.openxmlformats.org/presentationml/2006/main">
   <p:cSld>
     <p:spTree>
@@ -8115,7 +7987,7 @@
 </p:sld>
 </file>
 
-<file path=ppt/slides/slide34.xml><?xml version="1.0" encoding="utf-8"?>
+<file path=ppt/slides/slide33.xml><?xml version="1.0" encoding="utf-8"?>
 <p:sld xmlns:a="http://schemas.openxmlformats.org/drawingml/2006/main" xmlns:r="http://schemas.openxmlformats.org/officeDocument/2006/relationships" xmlns:p="http://schemas.openxmlformats.org/presentationml/2006/main">
   <p:cSld>
     <p:spTree>
@@ -8151,7 +8023,6 @@
               <a:rPr lang="en-US" dirty="0"/>
               <a:t>Metaphors in the wild</a:t>
             </a:r>
-            <a:endParaRPr lang="en-US" dirty="0"/>
           </a:p>
         </p:txBody>
       </p:sp>
@@ -8238,7 +8109,7 @@
 </p:sld>
 </file>
 
-<file path=ppt/slides/slide35.xml><?xml version="1.0" encoding="utf-8"?>
+<file path=ppt/slides/slide34.xml><?xml version="1.0" encoding="utf-8"?>
 <p:sld xmlns:a="http://schemas.openxmlformats.org/drawingml/2006/main" xmlns:r="http://schemas.openxmlformats.org/officeDocument/2006/relationships" xmlns:p="http://schemas.openxmlformats.org/presentationml/2006/main">
   <p:cSld>
     <p:spTree>

</xml_diff>